<commit_message>
Use reduced line count for experimentation
</commit_message>
<xml_diff>
--- a/book/images/cover/Book Cover.pptx
+++ b/book/images/cover/Book Cover.pptx
@@ -5,22 +5,23 @@
     <p:sldMasterId id="2147483696" r:id="rId1"/>
   </p:sldMasterIdLst>
   <p:notesMasterIdLst>
-    <p:notesMasterId r:id="rId5"/>
+    <p:notesMasterId r:id="rId6"/>
   </p:notesMasterIdLst>
   <p:sldIdLst>
     <p:sldId id="258" r:id="rId2"/>
     <p:sldId id="257" r:id="rId3"/>
-    <p:sldId id="256" r:id="rId4"/>
+    <p:sldId id="259" r:id="rId4"/>
+    <p:sldId id="256" r:id="rId5"/>
   </p:sldIdLst>
   <p:sldSz cx="14401800" cy="9829800"/>
   <p:notesSz cx="6858000" cy="9144000"/>
   <p:embeddedFontLst>
     <p:embeddedFont>
       <p:font typeface="TeXGyrePagella" panose="00000500000000000000" pitchFamily="50" charset="0"/>
-      <p:regular r:id="rId6"/>
-      <p:bold r:id="rId7"/>
-      <p:italic r:id="rId8"/>
-      <p:boldItalic r:id="rId9"/>
+      <p:regular r:id="rId7"/>
+      <p:bold r:id="rId8"/>
+      <p:italic r:id="rId9"/>
+      <p:boldItalic r:id="rId10"/>
     </p:embeddedFont>
   </p:embeddedFontLst>
   <p:defaultTextStyle>
@@ -208,7 +209,7 @@
           <a:p>
             <a:fld id="{4631FA5A-0C3E-4742-B6AD-B80374474249}" type="datetimeFigureOut">
               <a:rPr lang="en-US" smtClean="0"/>
-              <a:t>9/6/2024</a:t>
+              <a:t>9/13/2024</a:t>
             </a:fld>
             <a:endParaRPr lang="en-US"/>
           </a:p>
@@ -555,6 +556,95 @@
     </p:spTree>
     <p:extLst>
       <p:ext uri="{BB962C8B-B14F-4D97-AF65-F5344CB8AC3E}">
+        <p14:creationId xmlns:p14="http://schemas.microsoft.com/office/powerpoint/2010/main" val="2102398567"/>
+      </p:ext>
+    </p:extLst>
+  </p:cSld>
+  <p:clrMapOvr>
+    <a:masterClrMapping/>
+  </p:clrMapOvr>
+</p:notes>
+</file>
+
+<file path=ppt/notesSlides/notesSlide2.xml><?xml version="1.0" encoding="utf-8"?>
+<p:notes xmlns:a="http://schemas.openxmlformats.org/drawingml/2006/main" xmlns:r="http://schemas.openxmlformats.org/officeDocument/2006/relationships" xmlns:p="http://schemas.openxmlformats.org/presentationml/2006/main">
+  <p:cSld>
+    <p:spTree>
+      <p:nvGrpSpPr>
+        <p:cNvPr id="1" name=""/>
+        <p:cNvGrpSpPr/>
+        <p:nvPr/>
+      </p:nvGrpSpPr>
+      <p:grpSpPr>
+        <a:xfrm>
+          <a:off x="0" y="0"/>
+          <a:ext cx="0" cy="0"/>
+          <a:chOff x="0" y="0"/>
+          <a:chExt cx="0" cy="0"/>
+        </a:xfrm>
+      </p:grpSpPr>
+      <p:sp>
+        <p:nvSpPr>
+          <p:cNvPr id="2" name="Slide Image Placeholder 1"/>
+          <p:cNvSpPr>
+            <a:spLocks noGrp="1" noRot="1" noChangeAspect="1"/>
+          </p:cNvSpPr>
+          <p:nvPr>
+            <p:ph type="sldImg"/>
+          </p:nvPr>
+        </p:nvSpPr>
+        <p:spPr>
+          <a:xfrm>
+            <a:off x="1168400" y="1143000"/>
+            <a:ext cx="4521200" cy="3086100"/>
+          </a:xfrm>
+        </p:spPr>
+      </p:sp>
+      <p:sp>
+        <p:nvSpPr>
+          <p:cNvPr id="3" name="Notes Placeholder 2"/>
+          <p:cNvSpPr>
+            <a:spLocks noGrp="1"/>
+          </p:cNvSpPr>
+          <p:nvPr>
+            <p:ph type="body" idx="1"/>
+          </p:nvPr>
+        </p:nvSpPr>
+        <p:spPr/>
+        <p:txBody>
+          <a:bodyPr/>
+          <a:lstStyle/>
+          <a:p>
+            <a:endParaRPr lang="en-US" dirty="0"/>
+          </a:p>
+        </p:txBody>
+      </p:sp>
+      <p:sp>
+        <p:nvSpPr>
+          <p:cNvPr id="4" name="Slide Number Placeholder 3"/>
+          <p:cNvSpPr>
+            <a:spLocks noGrp="1"/>
+          </p:cNvSpPr>
+          <p:nvPr>
+            <p:ph type="sldNum" sz="quarter" idx="5"/>
+          </p:nvPr>
+        </p:nvSpPr>
+        <p:spPr/>
+        <p:txBody>
+          <a:bodyPr/>
+          <a:lstStyle/>
+          <a:p>
+            <a:fld id="{6D7F8505-08BA-1145-A3F2-95255ED130AE}" type="slidenum">
+              <a:rPr lang="en-US" smtClean="0"/>
+              <a:t>4</a:t>
+            </a:fld>
+            <a:endParaRPr lang="en-US"/>
+          </a:p>
+        </p:txBody>
+      </p:sp>
+    </p:spTree>
+    <p:extLst>
+      <p:ext uri="{BB962C8B-B14F-4D97-AF65-F5344CB8AC3E}">
         <p14:creationId xmlns:p14="http://schemas.microsoft.com/office/powerpoint/2010/main" val="2179831389"/>
       </p:ext>
     </p:extLst>
@@ -696,7 +786,7 @@
           <a:p>
             <a:fld id="{AAA91E2B-DE77-4648-B8EB-FB3E5B7C0103}" type="datetimeFigureOut">
               <a:rPr lang="en-US" smtClean="0"/>
-              <a:t>9/6/2024</a:t>
+              <a:t>9/13/2024</a:t>
             </a:fld>
             <a:endParaRPr lang="en-US"/>
           </a:p>
@@ -866,7 +956,7 @@
           <a:p>
             <a:fld id="{AAA91E2B-DE77-4648-B8EB-FB3E5B7C0103}" type="datetimeFigureOut">
               <a:rPr lang="en-US" smtClean="0"/>
-              <a:t>9/6/2024</a:t>
+              <a:t>9/13/2024</a:t>
             </a:fld>
             <a:endParaRPr lang="en-US"/>
           </a:p>
@@ -1046,7 +1136,7 @@
           <a:p>
             <a:fld id="{AAA91E2B-DE77-4648-B8EB-FB3E5B7C0103}" type="datetimeFigureOut">
               <a:rPr lang="en-US" smtClean="0"/>
-              <a:t>9/6/2024</a:t>
+              <a:t>9/13/2024</a:t>
             </a:fld>
             <a:endParaRPr lang="en-US"/>
           </a:p>
@@ -1216,7 +1306,7 @@
           <a:p>
             <a:fld id="{AAA91E2B-DE77-4648-B8EB-FB3E5B7C0103}" type="datetimeFigureOut">
               <a:rPr lang="en-US" smtClean="0"/>
-              <a:t>9/6/2024</a:t>
+              <a:t>9/13/2024</a:t>
             </a:fld>
             <a:endParaRPr lang="en-US"/>
           </a:p>
@@ -1460,7 +1550,7 @@
           <a:p>
             <a:fld id="{AAA91E2B-DE77-4648-B8EB-FB3E5B7C0103}" type="datetimeFigureOut">
               <a:rPr lang="en-US" smtClean="0"/>
-              <a:t>9/6/2024</a:t>
+              <a:t>9/13/2024</a:t>
             </a:fld>
             <a:endParaRPr lang="en-US"/>
           </a:p>
@@ -1692,7 +1782,7 @@
           <a:p>
             <a:fld id="{AAA91E2B-DE77-4648-B8EB-FB3E5B7C0103}" type="datetimeFigureOut">
               <a:rPr lang="en-US" smtClean="0"/>
-              <a:t>9/6/2024</a:t>
+              <a:t>9/13/2024</a:t>
             </a:fld>
             <a:endParaRPr lang="en-US"/>
           </a:p>
@@ -2059,7 +2149,7 @@
           <a:p>
             <a:fld id="{AAA91E2B-DE77-4648-B8EB-FB3E5B7C0103}" type="datetimeFigureOut">
               <a:rPr lang="en-US" smtClean="0"/>
-              <a:t>9/6/2024</a:t>
+              <a:t>9/13/2024</a:t>
             </a:fld>
             <a:endParaRPr lang="en-US"/>
           </a:p>
@@ -2177,7 +2267,7 @@
           <a:p>
             <a:fld id="{AAA91E2B-DE77-4648-B8EB-FB3E5B7C0103}" type="datetimeFigureOut">
               <a:rPr lang="en-US" smtClean="0"/>
-              <a:t>9/6/2024</a:t>
+              <a:t>9/13/2024</a:t>
             </a:fld>
             <a:endParaRPr lang="en-US"/>
           </a:p>
@@ -2272,7 +2362,7 @@
           <a:p>
             <a:fld id="{AAA91E2B-DE77-4648-B8EB-FB3E5B7C0103}" type="datetimeFigureOut">
               <a:rPr lang="en-US" smtClean="0"/>
-              <a:t>9/6/2024</a:t>
+              <a:t>9/13/2024</a:t>
             </a:fld>
             <a:endParaRPr lang="en-US"/>
           </a:p>
@@ -2549,7 +2639,7 @@
           <a:p>
             <a:fld id="{AAA91E2B-DE77-4648-B8EB-FB3E5B7C0103}" type="datetimeFigureOut">
               <a:rPr lang="en-US" smtClean="0"/>
-              <a:t>9/6/2024</a:t>
+              <a:t>9/13/2024</a:t>
             </a:fld>
             <a:endParaRPr lang="en-US"/>
           </a:p>
@@ -2806,7 +2896,7 @@
           <a:p>
             <a:fld id="{AAA91E2B-DE77-4648-B8EB-FB3E5B7C0103}" type="datetimeFigureOut">
               <a:rPr lang="en-US" smtClean="0"/>
-              <a:t>9/6/2024</a:t>
+              <a:t>9/13/2024</a:t>
             </a:fld>
             <a:endParaRPr lang="en-US"/>
           </a:p>
@@ -3019,7 +3109,7 @@
           <a:p>
             <a:fld id="{AAA91E2B-DE77-4648-B8EB-FB3E5B7C0103}" type="datetimeFigureOut">
               <a:rPr lang="en-US" smtClean="0"/>
-              <a:t>9/6/2024</a:t>
+              <a:t>9/13/2024</a:t>
             </a:fld>
             <a:endParaRPr lang="en-US"/>
           </a:p>
@@ -3601,6 +3691,68 @@
 </file>
 
 <file path=ppt/slides/slide3.xml><?xml version="1.0" encoding="utf-8"?>
+<p:sld xmlns:a="http://schemas.openxmlformats.org/drawingml/2006/main" xmlns:r="http://schemas.openxmlformats.org/officeDocument/2006/relationships" xmlns:p="http://schemas.openxmlformats.org/presentationml/2006/main">
+  <p:cSld>
+    <p:spTree>
+      <p:nvGrpSpPr>
+        <p:cNvPr id="1" name=""/>
+        <p:cNvGrpSpPr/>
+        <p:nvPr/>
+      </p:nvGrpSpPr>
+      <p:grpSpPr>
+        <a:xfrm>
+          <a:off x="0" y="0"/>
+          <a:ext cx="0" cy="0"/>
+          <a:chOff x="0" y="0"/>
+          <a:chExt cx="0" cy="0"/>
+        </a:xfrm>
+      </p:grpSpPr>
+      <p:pic>
+        <p:nvPicPr>
+          <p:cNvPr id="5" name="Picture 4">
+            <a:extLst>
+              <a:ext uri="{FF2B5EF4-FFF2-40B4-BE49-F238E27FC236}">
+                <a16:creationId xmlns:a16="http://schemas.microsoft.com/office/drawing/2014/main" id="{B47B605B-4446-88C1-1F69-0E80869D115F}"/>
+              </a:ext>
+            </a:extLst>
+          </p:cNvPr>
+          <p:cNvPicPr>
+            <a:picLocks noChangeAspect="1"/>
+          </p:cNvPicPr>
+          <p:nvPr/>
+        </p:nvPicPr>
+        <p:blipFill>
+          <a:blip r:embed="rId3">
+            <a:alphaModFix amt="10000"/>
+          </a:blip>
+          <a:stretch>
+            <a:fillRect/>
+          </a:stretch>
+        </p:blipFill>
+        <p:spPr>
+          <a:xfrm>
+            <a:off x="0" y="0"/>
+            <a:ext cx="14401800" cy="9833828"/>
+          </a:xfrm>
+          <a:prstGeom prst="rect">
+            <a:avLst/>
+          </a:prstGeom>
+        </p:spPr>
+      </p:pic>
+    </p:spTree>
+    <p:extLst>
+      <p:ext uri="{BB962C8B-B14F-4D97-AF65-F5344CB8AC3E}">
+        <p14:creationId xmlns:p14="http://schemas.microsoft.com/office/powerpoint/2010/main" val="813616842"/>
+      </p:ext>
+    </p:extLst>
+  </p:cSld>
+  <p:clrMapOvr>
+    <a:masterClrMapping/>
+  </p:clrMapOvr>
+</p:sld>
+</file>
+
+<file path=ppt/slides/slide4.xml><?xml version="1.0" encoding="utf-8"?>
 <p:sld xmlns:a="http://schemas.openxmlformats.org/drawingml/2006/main" xmlns:r="http://schemas.openxmlformats.org/officeDocument/2006/relationships" xmlns:p="http://schemas.openxmlformats.org/presentationml/2006/main">
   <p:cSld>
     <p:bg>

</xml_diff>

<commit_message>
Regenerate cover page images only
</commit_message>
<xml_diff>
--- a/book/images/cover/Book Cover.pptx
+++ b/book/images/cover/Book Cover.pptx
@@ -3709,6 +3709,36 @@
       </p:grpSpPr>
       <p:pic>
         <p:nvPicPr>
+          <p:cNvPr id="29" name="Picture 28">
+            <a:extLst>
+              <a:ext uri="{FF2B5EF4-FFF2-40B4-BE49-F238E27FC236}">
+                <a16:creationId xmlns:a16="http://schemas.microsoft.com/office/drawing/2014/main" id="{C9343170-A031-2587-9831-6AE8FC1DB23E}"/>
+              </a:ext>
+            </a:extLst>
+          </p:cNvPr>
+          <p:cNvPicPr>
+            <a:picLocks noChangeAspect="1"/>
+          </p:cNvPicPr>
+          <p:nvPr/>
+        </p:nvPicPr>
+        <p:blipFill>
+          <a:blip r:embed="rId3"/>
+          <a:stretch>
+            <a:fillRect/>
+          </a:stretch>
+        </p:blipFill>
+        <p:spPr>
+          <a:xfrm>
+            <a:off x="0" y="285"/>
+            <a:ext cx="14401800" cy="9829229"/>
+          </a:xfrm>
+          <a:prstGeom prst="rect">
+            <a:avLst/>
+          </a:prstGeom>
+        </p:spPr>
+      </p:pic>
+      <p:pic>
+        <p:nvPicPr>
           <p:cNvPr id="5" name="Picture 4">
             <a:extLst>
               <a:ext uri="{FF2B5EF4-FFF2-40B4-BE49-F238E27FC236}">
@@ -3722,8 +3752,8 @@
           <p:nvPr/>
         </p:nvPicPr>
         <p:blipFill>
-          <a:blip r:embed="rId3">
-            <a:alphaModFix amt="10000"/>
+          <a:blip r:embed="rId4">
+            <a:alphaModFix amt="25000"/>
           </a:blip>
           <a:stretch>
             <a:fillRect/>

</xml_diff>